<commit_message>
Updates for lec/lab 01.
</commit_message>
<xml_diff>
--- a/server/presentations/Lab-01_Setup.pptx
+++ b/server/presentations/Lab-01_Setup.pptx
@@ -5,10 +5,10 @@
     <p:sldMasterId id="2147483648" r:id="rId1"/>
   </p:sldMasterIdLst>
   <p:notesMasterIdLst>
-    <p:notesMasterId r:id="rId20"/>
+    <p:notesMasterId r:id="rId21"/>
   </p:notesMasterIdLst>
   <p:handoutMasterIdLst>
-    <p:handoutMasterId r:id="rId21"/>
+    <p:handoutMasterId r:id="rId22"/>
   </p:handoutMasterIdLst>
   <p:sldIdLst>
     <p:sldId id="256" r:id="rId2"/>
@@ -27,8 +27,9 @@
     <p:sldId id="303" r:id="rId15"/>
     <p:sldId id="304" r:id="rId16"/>
     <p:sldId id="305" r:id="rId17"/>
-    <p:sldId id="287" r:id="rId18"/>
-    <p:sldId id="286" r:id="rId19"/>
+    <p:sldId id="307" r:id="rId18"/>
+    <p:sldId id="287" r:id="rId19"/>
+    <p:sldId id="286" r:id="rId20"/>
   </p:sldIdLst>
   <p:sldSz cx="9144000" cy="5143500" type="screen16x9"/>
   <p:notesSz cx="6858000" cy="9144000"/>
@@ -4810,7 +4811,6 @@
               <a:rPr lang="en-US" dirty="0" smtClean="0"/>
               <a:t>Create a primary index:</a:t>
             </a:r>
-            <a:endParaRPr lang="en-US" dirty="0" smtClean="0"/>
           </a:p>
           <a:p>
             <a:r>
@@ -5194,10 +5194,6 @@
               </a:rPr>
               <a:t>airport”;</a:t>
             </a:r>
-            <a:endParaRPr lang="en-US" sz="1800" dirty="0" smtClean="0">
-              <a:latin typeface="Consolas"/>
-              <a:cs typeface="Consolas"/>
-            </a:endParaRPr>
           </a:p>
           <a:p>
             <a:pPr marL="230188" indent="0">
@@ -5401,6 +5397,199 @@
             <a:spLocks noGrp="1"/>
           </p:cNvSpPr>
           <p:nvPr>
+            <p:ph type="title"/>
+          </p:nvPr>
+        </p:nvSpPr>
+        <p:spPr/>
+        <p:txBody>
+          <a:bodyPr/>
+          <a:lstStyle/>
+          <a:p>
+            <a:r>
+              <a:rPr lang="en-US" dirty="0" smtClean="0"/>
+              <a:t>Other Resources</a:t>
+            </a:r>
+            <a:endParaRPr lang="en-US" dirty="0"/>
+          </a:p>
+        </p:txBody>
+      </p:sp>
+      <p:sp>
+        <p:nvSpPr>
+          <p:cNvPr id="3" name="Content Placeholder 2"/>
+          <p:cNvSpPr>
+            <a:spLocks noGrp="1"/>
+          </p:cNvSpPr>
+          <p:nvPr>
+            <p:ph idx="1"/>
+          </p:nvPr>
+        </p:nvSpPr>
+        <p:spPr/>
+        <p:txBody>
+          <a:bodyPr/>
+          <a:lstStyle/>
+          <a:p>
+            <a:r>
+              <a:rPr lang="en-US" dirty="0" smtClean="0"/>
+              <a:t>4.0 </a:t>
+            </a:r>
+            <a:r>
+              <a:rPr lang="en-US" dirty="0"/>
+              <a:t>Beta Documentation: </a:t>
+            </a:r>
+            <a:r>
+              <a:rPr lang="en-US" dirty="0">
+                <a:hlinkClick r:id="rId2"/>
+              </a:rPr>
+              <a:t>http://docs.couchbase.com/</a:t>
+            </a:r>
+            <a:r>
+              <a:rPr lang="en-US" dirty="0" smtClean="0">
+                <a:hlinkClick r:id="rId2"/>
+              </a:rPr>
+              <a:t>4.0</a:t>
+            </a:r>
+            <a:endParaRPr lang="en-US" dirty="0" smtClean="0"/>
+          </a:p>
+          <a:p>
+            <a:r>
+              <a:rPr lang="en-US" dirty="0" smtClean="0"/>
+              <a:t>4.0 Guide </a:t>
+            </a:r>
+            <a:r>
+              <a:rPr lang="en-US" dirty="0"/>
+              <a:t>to What’s New: </a:t>
+            </a:r>
+            <a:r>
+              <a:rPr lang="en-US" dirty="0" smtClean="0"/>
+              <a:t/>
+            </a:r>
+            <a:br>
+              <a:rPr lang="en-US" dirty="0" smtClean="0"/>
+            </a:br>
+            <a:r>
+              <a:rPr lang="en-US" sz="2000" dirty="0" smtClean="0">
+                <a:hlinkClick r:id="rId3"/>
+              </a:rPr>
+              <a:t>http</a:t>
+            </a:r>
+            <a:r>
+              <a:rPr lang="en-US" sz="2000" dirty="0">
+                <a:hlinkClick r:id="rId3"/>
+              </a:rPr>
+              <a:t>://docs.couchbase.com/4.0/intro/whats-new.html#whats-</a:t>
+            </a:r>
+            <a:r>
+              <a:rPr lang="en-US" sz="2000" dirty="0" smtClean="0">
+                <a:hlinkClick r:id="rId3"/>
+              </a:rPr>
+              <a:t>new</a:t>
+            </a:r>
+            <a:endParaRPr lang="en-US" sz="2000" dirty="0" smtClean="0"/>
+          </a:p>
+          <a:p>
+            <a:r>
+              <a:rPr lang="en-US" dirty="0" smtClean="0"/>
+              <a:t>Sample </a:t>
+            </a:r>
+            <a:r>
+              <a:rPr lang="en-US" dirty="0"/>
+              <a:t>travel app:</a:t>
+            </a:r>
+            <a:br>
+              <a:rPr lang="en-US" dirty="0"/>
+            </a:br>
+            <a:r>
+              <a:rPr lang="en-US" dirty="0">
+                <a:hlinkClick r:id="rId4"/>
+              </a:rPr>
+              <a:t>http://docs.couchbase.com/4.0/travel-app/</a:t>
+            </a:r>
+            <a:r>
+              <a:rPr lang="en-US" dirty="0" smtClean="0">
+                <a:hlinkClick r:id="rId4"/>
+              </a:rPr>
+              <a:t>index.html</a:t>
+            </a:r>
+            <a:endParaRPr lang="en-US" dirty="0" smtClean="0"/>
+          </a:p>
+          <a:p>
+            <a:r>
+              <a:rPr lang="en-US" dirty="0" smtClean="0"/>
+              <a:t>N1QL and </a:t>
+            </a:r>
+            <a:r>
+              <a:rPr lang="en-US" dirty="0"/>
+              <a:t>SQL Differences:</a:t>
+            </a:r>
+            <a:br>
+              <a:rPr lang="en-US" dirty="0"/>
+            </a:br>
+            <a:r>
+              <a:rPr lang="en-US" sz="2000" dirty="0">
+                <a:hlinkClick r:id="rId5"/>
+              </a:rPr>
+              <a:t>http://docs.couchbase.com/4.0/n1ql/n1ql-basics/</a:t>
+            </a:r>
+            <a:r>
+              <a:rPr lang="en-US" sz="2000" dirty="0" smtClean="0">
+                <a:hlinkClick r:id="rId5"/>
+              </a:rPr>
+              <a:t>N1QLSQL.html</a:t>
+            </a:r>
+            <a:endParaRPr lang="en-US" sz="2000" dirty="0" smtClean="0"/>
+          </a:p>
+          <a:p>
+            <a:endParaRPr lang="en-US" dirty="0"/>
+          </a:p>
+          <a:p>
+            <a:endParaRPr lang="en-US" dirty="0"/>
+          </a:p>
+        </p:txBody>
+      </p:sp>
+    </p:spTree>
+    <p:extLst>
+      <p:ext uri="{BB962C8B-B14F-4D97-AF65-F5344CB8AC3E}">
+        <p14:creationId xmlns:p14="http://schemas.microsoft.com/office/powerpoint/2010/main" val="2386396524"/>
+      </p:ext>
+    </p:extLst>
+  </p:cSld>
+  <p:clrMapOvr>
+    <a:masterClrMapping/>
+  </p:clrMapOvr>
+  <p:timing>
+    <p:tnLst>
+      <p:par>
+        <p:cTn xmlns:p14="http://schemas.microsoft.com/office/powerpoint/2010/main" id="1" dur="indefinite" restart="never" nodeType="tmRoot"/>
+      </p:par>
+    </p:tnLst>
+  </p:timing>
+</p:sld>
+</file>
+
+<file path=ppt/slides/slide18.xml><?xml version="1.0" encoding="utf-8"?>
+<p:sld xmlns:a="http://schemas.openxmlformats.org/drawingml/2006/main" xmlns:r="http://schemas.openxmlformats.org/officeDocument/2006/relationships" xmlns:p="http://schemas.openxmlformats.org/presentationml/2006/main">
+  <p:cSld>
+    <p:spTree>
+      <p:nvGrpSpPr>
+        <p:cNvPr id="1" name=""/>
+        <p:cNvGrpSpPr/>
+        <p:nvPr/>
+      </p:nvGrpSpPr>
+      <p:grpSpPr>
+        <a:xfrm>
+          <a:off x="0" y="0"/>
+          <a:ext cx="0" cy="0"/>
+          <a:chOff x="0" y="0"/>
+          <a:chExt cx="0" cy="0"/>
+        </a:xfrm>
+      </p:grpSpPr>
+      <p:sp>
+        <p:nvSpPr>
+          <p:cNvPr id="2" name="Title 1"/>
+          <p:cNvSpPr>
+            <a:spLocks noGrp="1"/>
+          </p:cNvSpPr>
+          <p:nvPr>
             <p:ph type="ctrTitle"/>
           </p:nvPr>
         </p:nvSpPr>
@@ -5456,7 +5645,7 @@
 </p:sld>
 </file>
 
-<file path=ppt/slides/slide18.xml><?xml version="1.0" encoding="utf-8"?>
+<file path=ppt/slides/slide19.xml><?xml version="1.0" encoding="utf-8"?>
 <p:sld xmlns:a="http://schemas.openxmlformats.org/drawingml/2006/main" xmlns:r="http://schemas.openxmlformats.org/officeDocument/2006/relationships" xmlns:p="http://schemas.openxmlformats.org/presentationml/2006/main">
   <p:cSld>
     <p:spTree>
@@ -6004,7 +6193,11 @@
           <a:p>
             <a:r>
               <a:rPr lang="en-US" dirty="0" smtClean="0"/>
-              <a:t>Download and Install 4.0 beta candidate build</a:t>
+              <a:t>Download and Install 4.0 </a:t>
+            </a:r>
+            <a:r>
+              <a:rPr lang="en-US" dirty="0" smtClean="0"/>
+              <a:t>Beta</a:t>
             </a:r>
             <a:endParaRPr lang="en-US" dirty="0"/>
           </a:p>
@@ -6020,18 +6213,65 @@
             <p:ph idx="1"/>
           </p:nvPr>
         </p:nvSpPr>
-        <p:spPr/>
+        <p:spPr>
+          <a:xfrm>
+            <a:off x="457200" y="685800"/>
+            <a:ext cx="8007739" cy="4110318"/>
+          </a:xfrm>
+        </p:spPr>
         <p:txBody>
           <a:bodyPr>
-            <a:normAutofit fontScale="92500"/>
+            <a:normAutofit fontScale="92500" lnSpcReduction="10000"/>
           </a:bodyPr>
           <a:lstStyle/>
           <a:p>
+            <a:pPr marL="0" indent="0">
+              <a:buNone/>
+            </a:pPr>
+            <a:r>
+              <a:rPr lang="en-US" dirty="0" smtClean="0"/>
+              <a:t>If you already have 4.0 DP, you can continue working with that release.</a:t>
+            </a:r>
+            <a:endParaRPr lang="en-US" dirty="0" smtClean="0">
+              <a:hlinkClick r:id="rId2"/>
+            </a:endParaRPr>
+          </a:p>
+          <a:p>
             <a:r>
               <a:rPr lang="en-US" dirty="0" smtClean="0">
                 <a:hlinkClick r:id="rId2"/>
               </a:rPr>
-              <a:t>http:</a:t>
+              <a:t>http://couchbase.com/download</a:t>
+            </a:r>
+            <a:r>
+              <a:rPr lang="en-US" dirty="0" smtClean="0"/>
+              <a:t> and then click on </a:t>
+            </a:r>
+            <a:r>
+              <a:rPr lang="en-US" i="1" dirty="0" smtClean="0"/>
+              <a:t>Pre-Release</a:t>
+            </a:r>
+            <a:endParaRPr lang="en-US" i="1" dirty="0" smtClean="0">
+              <a:hlinkClick r:id="rId2"/>
+            </a:endParaRPr>
+          </a:p>
+          <a:p>
+            <a:endParaRPr lang="en-US" dirty="0" smtClean="0">
+              <a:hlinkClick r:id="rId2"/>
+            </a:endParaRPr>
+          </a:p>
+          <a:p>
+            <a:r>
+              <a:rPr lang="en-US" dirty="0" smtClean="0">
+                <a:hlinkClick r:id="rId2"/>
+              </a:rPr>
+              <a:t>http</a:t>
+            </a:r>
+            <a:r>
+              <a:rPr lang="en-US" dirty="0" smtClean="0">
+                <a:hlinkClick r:id="rId2"/>
+              </a:rPr>
+              <a:t>:</a:t>
             </a:r>
             <a:r>
               <a:rPr lang="en-US" dirty="0">
@@ -6591,6 +6831,13 @@
   <p:clrMapOvr>
     <a:masterClrMapping/>
   </p:clrMapOvr>
+  <p:timing>
+    <p:tnLst>
+      <p:par>
+        <p:cTn xmlns:p14="http://schemas.microsoft.com/office/powerpoint/2010/main" id="1" dur="indefinite" restart="never" nodeType="tmRoot"/>
+      </p:par>
+    </p:tnLst>
+  </p:timing>
 </p:sld>
 </file>
 

</xml_diff>